<commit_message>
Add extra slide to presentation
</commit_message>
<xml_diff>
--- a/presentation.pptx
+++ b/presentation.pptx
@@ -5,7 +5,7 @@
     <p:sldMasterId id="2147483660" r:id="rId1"/>
   </p:sldMasterIdLst>
   <p:notesMasterIdLst>
-    <p:notesMasterId r:id="rId13"/>
+    <p:notesMasterId r:id="rId14"/>
   </p:notesMasterIdLst>
   <p:sldIdLst>
     <p:sldId id="256" r:id="rId2"/>
@@ -18,7 +18,8 @@
     <p:sldId id="263" r:id="rId9"/>
     <p:sldId id="264" r:id="rId10"/>
     <p:sldId id="265" r:id="rId11"/>
-    <p:sldId id="266" r:id="rId12"/>
+    <p:sldId id="267" r:id="rId12"/>
+    <p:sldId id="266" r:id="rId13"/>
   </p:sldIdLst>
   <p:sldSz cx="9144000" cy="6858000" type="screen4x3"/>
   <p:notesSz cx="6858000" cy="9144000"/>
@@ -202,7 +203,7 @@
           <a:p>
             <a:fld id="{65321370-ED2B-184F-ADBA-33B431E1BCBA}" type="datetimeFigureOut">
               <a:rPr lang="en-US" smtClean="0"/>
-              <a:t>27.4.2013</a:t>
+              <a:t>4/30/2013</a:t>
             </a:fld>
             <a:endParaRPr lang="en-US"/>
           </a:p>
@@ -1141,7 +1142,7 @@
             <a:fld id="{3F150D65-C64D-44FB-9152-4CC2DE0C9198}" type="datetime1">
               <a:rPr lang="en-US" smtClean="0"/>
               <a:pPr/>
-              <a:t>27.4.2013</a:t>
+              <a:t>4/30/2013</a:t>
             </a:fld>
             <a:endParaRPr lang="en-US"/>
           </a:p>
@@ -1356,7 +1357,7 @@
             <a:fld id="{42635EB0-D091-417E-ACD5-D65E1C7D8524}" type="datetime1">
               <a:rPr lang="en-US" smtClean="0"/>
               <a:pPr/>
-              <a:t>27.4.2013</a:t>
+              <a:t>4/30/2013</a:t>
             </a:fld>
             <a:endParaRPr lang="en-US"/>
           </a:p>
@@ -1533,7 +1534,7 @@
             <a:fld id="{7FCA09F9-C7D6-4C52-A7E8-5101239A0BA2}" type="datetime1">
               <a:rPr lang="en-US" smtClean="0"/>
               <a:pPr/>
-              <a:t>27.4.2013</a:t>
+              <a:t>4/30/2013</a:t>
             </a:fld>
             <a:endParaRPr lang="en-US"/>
           </a:p>
@@ -1700,7 +1701,7 @@
             <a:fld id="{0FFE64A4-35FB-42B6-9183-2C0CE0E36649}" type="datetime1">
               <a:rPr lang="en-US" smtClean="0"/>
               <a:pPr/>
-              <a:t>27.4.2013</a:t>
+              <a:t>4/30/2013</a:t>
             </a:fld>
             <a:endParaRPr lang="en-US"/>
           </a:p>
@@ -1986,7 +1987,7 @@
             <a:fld id="{2A2683B9-6ECA-47FA-93CF-B124A0FAC208}" type="datetime1">
               <a:rPr lang="en-US" smtClean="0"/>
               <a:pPr/>
-              <a:t>27.4.2013</a:t>
+              <a:t>4/30/2013</a:t>
             </a:fld>
             <a:endParaRPr lang="en-US"/>
           </a:p>
@@ -2314,7 +2315,7 @@
             <a:fld id="{305FF66B-9476-4BB3-85E9-E01854F07F90}" type="datetime1">
               <a:rPr lang="en-US" smtClean="0"/>
               <a:pPr/>
-              <a:t>27.4.2013</a:t>
+              <a:t>4/30/2013</a:t>
             </a:fld>
             <a:endParaRPr lang="en-US"/>
           </a:p>
@@ -2741,7 +2742,7 @@
             <a:fld id="{56B23FBD-8F7D-4F85-8085-67BFDB05CB71}" type="datetime1">
               <a:rPr lang="en-US" smtClean="0"/>
               <a:pPr/>
-              <a:t>27.4.2013</a:t>
+              <a:t>4/30/2013</a:t>
             </a:fld>
             <a:endParaRPr lang="en-US"/>
           </a:p>
@@ -2916,7 +2917,7 @@
             <a:fld id="{465D789A-1220-4441-8676-44A034051BFD}" type="datetime1">
               <a:rPr lang="en-US" smtClean="0"/>
               <a:pPr/>
-              <a:t>27.4.2013</a:t>
+              <a:t>4/30/2013</a:t>
             </a:fld>
             <a:endParaRPr lang="en-US"/>
           </a:p>
@@ -3008,7 +3009,7 @@
             <a:fld id="{EF98A266-E364-4B5E-98DD-432668182E1E}" type="datetime1">
               <a:rPr lang="en-US" smtClean="0"/>
               <a:pPr/>
-              <a:t>27.4.2013</a:t>
+              <a:t>4/30/2013</a:t>
             </a:fld>
             <a:endParaRPr lang="en-US"/>
           </a:p>
@@ -3290,7 +3291,7 @@
             <a:fld id="{493F2040-9975-4642-A906-1DF87F8BE202}" type="datetime1">
               <a:rPr lang="en-US" smtClean="0"/>
               <a:pPr/>
-              <a:t>27.4.2013</a:t>
+              <a:t>4/30/2013</a:t>
             </a:fld>
             <a:endParaRPr lang="en-US"/>
           </a:p>
@@ -3591,7 +3592,7 @@
             <a:fld id="{51E52B4A-BA08-4841-AB08-A0D822ABC34D}" type="datetime1">
               <a:rPr lang="en-US" smtClean="0"/>
               <a:pPr/>
-              <a:t>27.4.2013</a:t>
+              <a:t>4/30/2013</a:t>
             </a:fld>
             <a:endParaRPr lang="en-US"/>
           </a:p>
@@ -3803,7 +3804,7 @@
             <a:fld id="{75D48070-6A81-47D0-9810-1540B9FEFF61}" type="datetime1">
               <a:rPr lang="en-US" smtClean="0"/>
               <a:pPr/>
-              <a:t>27.4.2013</a:t>
+              <a:t>4/30/2013</a:t>
             </a:fld>
             <a:endParaRPr lang="en-US"/>
           </a:p>
@@ -4437,7 +4438,7 @@
           <p:nvPr/>
         </p:nvPicPr>
         <p:blipFill>
-          <a:blip r:embed="rId2">
+          <a:blip r:embed="rId2" cstate="email">
             <a:extLst>
               <a:ext uri="{28A0092B-C50C-407E-A947-70E740481C1C}">
                 <a14:useLocalDpi xmlns:a14="http://schemas.microsoft.com/office/drawing/2010/main" val="0"/>
@@ -4539,15 +4540,7 @@
             </a:pPr>
             <a:r>
               <a:rPr lang="en-US" dirty="0" smtClean="0"/>
-              <a:t>Tools: </a:t>
-            </a:r>
-            <a:r>
-              <a:rPr lang="en-US" dirty="0" err="1" smtClean="0"/>
-              <a:t>GitHub</a:t>
-            </a:r>
-            <a:r>
-              <a:rPr lang="en-US" dirty="0" smtClean="0"/>
-              <a:t>, Sublime Text, Adobe Photoshop</a:t>
+              <a:t>Tools: GitHub, Sublime Text, Adobe Photoshop</a:t>
             </a:r>
           </a:p>
           <a:p>
@@ -4573,7 +4566,7 @@
           <p:nvPr/>
         </p:nvPicPr>
         <p:blipFill>
-          <a:blip r:embed="rId2">
+          <a:blip r:embed="rId2" cstate="email">
             <a:extLst>
               <a:ext uri="{28A0092B-C50C-407E-A947-70E740481C1C}">
                 <a14:useLocalDpi xmlns:a14="http://schemas.microsoft.com/office/drawing/2010/main" val="0"/>
@@ -4607,7 +4600,7 @@
   <p:timing>
     <p:tnLst>
       <p:par>
-        <p:cTn xmlns:p14="http://schemas.microsoft.com/office/powerpoint/2010/main" id="1" dur="indefinite" restart="never" nodeType="tmRoot"/>
+        <p:cTn id="1" dur="indefinite" restart="never" nodeType="tmRoot"/>
       </p:par>
     </p:tnLst>
   </p:timing>
@@ -4648,6 +4641,100 @@
           <a:p>
             <a:r>
               <a:rPr lang="en-US" dirty="0" smtClean="0"/>
+              <a:t>GitHub interface</a:t>
+            </a:r>
+            <a:endParaRPr lang="bg-BG" dirty="0"/>
+          </a:p>
+        </p:txBody>
+      </p:sp>
+      <p:pic>
+        <p:nvPicPr>
+          <p:cNvPr id="4" name="Picture 2" descr="C:\Users\leslyto\Desktop\githubscreenshot.JPG"/>
+          <p:cNvPicPr>
+            <a:picLocks noChangeAspect="1" noChangeArrowheads="1"/>
+          </p:cNvPicPr>
+          <p:nvPr/>
+        </p:nvPicPr>
+        <p:blipFill>
+          <a:blip r:embed="rId2" cstate="email">
+            <a:extLst>
+              <a:ext uri="{28A0092B-C50C-407E-A947-70E740481C1C}">
+                <a14:useLocalDpi xmlns:a14="http://schemas.microsoft.com/office/drawing/2010/main" val="0"/>
+              </a:ext>
+            </a:extLst>
+          </a:blip>
+          <a:srcRect/>
+          <a:stretch>
+            <a:fillRect/>
+          </a:stretch>
+        </p:blipFill>
+        <p:spPr bwMode="auto">
+          <a:xfrm>
+            <a:off x="762000" y="2012956"/>
+            <a:ext cx="7543800" cy="3992813"/>
+          </a:xfrm>
+          <a:prstGeom prst="rect">
+            <a:avLst/>
+          </a:prstGeom>
+          <a:noFill/>
+          <a:extLst>
+            <a:ext uri="{909E8E84-426E-40DD-AFC4-6F175D3DCCD1}">
+              <a14:hiddenFill xmlns:a14="http://schemas.microsoft.com/office/drawing/2010/main">
+                <a:solidFill>
+                  <a:srgbClr val="FFFFFF"/>
+                </a:solidFill>
+              </a14:hiddenFill>
+            </a:ext>
+          </a:extLst>
+        </p:spPr>
+      </p:pic>
+    </p:spTree>
+    <p:extLst>
+      <p:ext uri="{BB962C8B-B14F-4D97-AF65-F5344CB8AC3E}">
+        <p14:creationId xmlns:p14="http://schemas.microsoft.com/office/powerpoint/2010/main" val="1640814258"/>
+      </p:ext>
+    </p:extLst>
+  </p:cSld>
+  <p:clrMapOvr>
+    <a:masterClrMapping/>
+  </p:clrMapOvr>
+</p:sld>
+</file>
+
+<file path=ppt/slides/slide12.xml><?xml version="1.0" encoding="utf-8"?>
+<p:sld xmlns:a="http://schemas.openxmlformats.org/drawingml/2006/main" xmlns:r="http://schemas.openxmlformats.org/officeDocument/2006/relationships" xmlns:p="http://schemas.openxmlformats.org/presentationml/2006/main">
+  <p:cSld>
+    <p:spTree>
+      <p:nvGrpSpPr>
+        <p:cNvPr id="1" name=""/>
+        <p:cNvGrpSpPr/>
+        <p:nvPr/>
+      </p:nvGrpSpPr>
+      <p:grpSpPr>
+        <a:xfrm>
+          <a:off x="0" y="0"/>
+          <a:ext cx="0" cy="0"/>
+          <a:chOff x="0" y="0"/>
+          <a:chExt cx="0" cy="0"/>
+        </a:xfrm>
+      </p:grpSpPr>
+      <p:sp>
+        <p:nvSpPr>
+          <p:cNvPr id="2" name="Title 1"/>
+          <p:cNvSpPr>
+            <a:spLocks noGrp="1"/>
+          </p:cNvSpPr>
+          <p:nvPr>
+            <p:ph type="title"/>
+          </p:nvPr>
+        </p:nvSpPr>
+        <p:spPr/>
+        <p:txBody>
+          <a:bodyPr/>
+          <a:lstStyle/>
+          <a:p>
+            <a:r>
+              <a:rPr lang="en-US" dirty="0" smtClean="0"/>
               <a:t>Final product</a:t>
             </a:r>
             <a:endParaRPr lang="en-US" dirty="0"/>
@@ -4664,7 +4751,12 @@
             <p:ph idx="1"/>
           </p:nvPr>
         </p:nvSpPr>
-        <p:spPr/>
+        <p:spPr>
+          <a:xfrm>
+            <a:off x="761999" y="1672903"/>
+            <a:ext cx="7543800" cy="4523181"/>
+          </a:xfrm>
+        </p:spPr>
         <p:txBody>
           <a:bodyPr/>
           <a:lstStyle/>
@@ -5070,7 +5162,7 @@
           <p:nvPr/>
         </p:nvPicPr>
         <p:blipFill>
-          <a:blip r:embed="rId3">
+          <a:blip r:embed="rId3" cstate="email">
             <a:extLst>
               <a:ext uri="{28A0092B-C50C-407E-A947-70E740481C1C}">
                 <a14:useLocalDpi xmlns:a14="http://schemas.microsoft.com/office/drawing/2010/main" val="0"/>
@@ -5100,7 +5192,7 @@
           <p:nvPr/>
         </p:nvPicPr>
         <p:blipFill>
-          <a:blip r:embed="rId4">
+          <a:blip r:embed="rId4" cstate="email">
             <a:extLst>
               <a:ext uri="{28A0092B-C50C-407E-A947-70E740481C1C}">
                 <a14:useLocalDpi xmlns:a14="http://schemas.microsoft.com/office/drawing/2010/main" val="0"/>
@@ -5473,7 +5565,7 @@
           <p:nvPr/>
         </p:nvPicPr>
         <p:blipFill>
-          <a:blip r:embed="rId3">
+          <a:blip r:embed="rId3" cstate="email">
             <a:extLst>
               <a:ext uri="{28A0092B-C50C-407E-A947-70E740481C1C}">
                 <a14:useLocalDpi xmlns:a14="http://schemas.microsoft.com/office/drawing/2010/main" val="0"/>
@@ -5507,7 +5599,7 @@
   <p:timing>
     <p:tnLst>
       <p:par>
-        <p:cTn xmlns:p14="http://schemas.microsoft.com/office/powerpoint/2010/main" id="1" dur="indefinite" restart="never" nodeType="tmRoot"/>
+        <p:cTn id="1" dur="indefinite" restart="never" nodeType="tmRoot"/>
       </p:par>
     </p:tnLst>
   </p:timing>
@@ -5565,7 +5657,7 @@
           </p:nvPr>
         </p:nvPicPr>
         <p:blipFill>
-          <a:blip r:embed="rId3">
+          <a:blip r:embed="rId3" cstate="email">
             <a:extLst>
               <a:ext uri="{28A0092B-C50C-407E-A947-70E740481C1C}">
                 <a14:useLocalDpi xmlns:a14="http://schemas.microsoft.com/office/drawing/2010/main" val="0"/>
@@ -5597,7 +5689,7 @@
   <p:timing>
     <p:tnLst>
       <p:par>
-        <p:cTn xmlns:p14="http://schemas.microsoft.com/office/powerpoint/2010/main" id="1" dur="indefinite" restart="never" nodeType="tmRoot"/>
+        <p:cTn id="1" dur="indefinite" restart="never" nodeType="tmRoot"/>
       </p:par>
     </p:tnLst>
   </p:timing>
@@ -6028,7 +6120,7 @@
   <p:timing>
     <p:tnLst>
       <p:par>
-        <p:cTn xmlns:p14="http://schemas.microsoft.com/office/powerpoint/2010/main" id="1" dur="indefinite" restart="never" nodeType="tmRoot"/>
+        <p:cTn id="1" dur="indefinite" restart="never" nodeType="tmRoot"/>
       </p:par>
     </p:tnLst>
   </p:timing>

</xml_diff>